<commit_message>
adding more modules hopefully
</commit_message>
<xml_diff>
--- a/module-1/Gonzalez_Mod1_TechnologyValueStream.pptx
+++ b/module-1/Gonzalez_Mod1_TechnologyValueStream.pptx
@@ -16,14 +16,15 @@
     <p:sldId id="261" r:id="rId12"/>
     <p:sldId id="262" r:id="rId13"/>
     <p:sldId id="263" r:id="rId14"/>
+    <p:sldId id="264" r:id="rId15"/>
   </p:sldIdLst>
   <p:sldSz cy="5143500" cx="9144000"/>
   <p:notesSz cx="6858000" cy="9144000"/>
   <p:embeddedFontLst>
     <p:embeddedFont>
       <p:font typeface="Orbitron SemiBold"/>
-      <p:regular r:id="rId15"/>
-      <p:bold r:id="rId16"/>
+      <p:regular r:id="rId16"/>
+      <p:bold r:id="rId17"/>
     </p:embeddedFont>
   </p:embeddedFontLst>
   <p:defaultTextStyle>
@@ -1448,6 +1449,105 @@
       <p:sp>
         <p:nvSpPr>
           <p:cNvPr id="97" name="Google Shape;97;g324fb4a8e0b_0_32:notes"/>
+          <p:cNvSpPr txBox="1"/>
+          <p:nvPr>
+            <p:ph idx="1" type="body"/>
+          </p:nvPr>
+        </p:nvSpPr>
+        <p:spPr>
+          <a:xfrm>
+            <a:off x="685800" y="4343400"/>
+            <a:ext cx="5486400" cy="4114800"/>
+          </a:xfrm>
+          <a:prstGeom prst="rect">
+            <a:avLst/>
+          </a:prstGeom>
+        </p:spPr>
+        <p:txBody>
+          <a:bodyPr anchorCtr="0" anchor="t" bIns="91425" lIns="91425" spcFirstLastPara="1" rIns="91425" wrap="square" tIns="91425">
+            <a:noAutofit/>
+          </a:bodyPr>
+          <a:lstStyle/>
+          <a:p>
+            <a:pPr indent="0" lvl="0" marL="0" rtl="0" algn="l">
+              <a:spcBef>
+                <a:spcPts val="0"/>
+              </a:spcBef>
+              <a:spcAft>
+                <a:spcPts val="0"/>
+              </a:spcAft>
+              <a:buNone/>
+            </a:pPr>
+            <a:r>
+              <a:t/>
+            </a:r>
+            <a:endParaRPr/>
+          </a:p>
+        </p:txBody>
+      </p:sp>
+    </p:spTree>
+  </p:cSld>
+  <p:clrMapOvr>
+    <a:masterClrMapping/>
+  </p:clrMapOvr>
+</p:notes>
+</file>
+
+<file path=ppt/notesSlides/notesSlide9.xml><?xml version="1.0" encoding="utf-8"?>
+<p:notes xmlns:a="http://schemas.openxmlformats.org/drawingml/2006/main" xmlns:r="http://schemas.openxmlformats.org/officeDocument/2006/relationships" xmlns:mc="http://schemas.openxmlformats.org/markup-compatibility/2006" xmlns:mv="urn:schemas-microsoft-com:mac:vml" xmlns:p="http://schemas.openxmlformats.org/presentationml/2006/main" xmlns:c="http://schemas.openxmlformats.org/drawingml/2006/chart" xmlns:dgm="http://schemas.openxmlformats.org/drawingml/2006/diagram" xmlns:o="urn:schemas-microsoft-com:office:office" xmlns:v="urn:schemas-microsoft-com:vml" xmlns:pvml="urn:schemas-microsoft-com:office:powerpoint" xmlns:com="http://schemas.openxmlformats.org/drawingml/2006/compatibility" xmlns:p14="http://schemas.microsoft.com/office/powerpoint/2010/main" xmlns:p15="http://schemas.microsoft.com/office/powerpoint/2012/main" xmlns:ahyp="http://schemas.microsoft.com/office/drawing/2018/hyperlinkcolor" showMasterPhAnim="0" showMasterSp="0">
+  <p:cSld>
+    <p:spTree>
+      <p:nvGrpSpPr>
+        <p:cNvPr id="103" name="Shape 103"/>
+        <p:cNvGrpSpPr/>
+        <p:nvPr/>
+      </p:nvGrpSpPr>
+      <p:grpSpPr>
+        <a:xfrm>
+          <a:off x="0" y="0"/>
+          <a:ext cx="0" cy="0"/>
+          <a:chOff x="0" y="0"/>
+          <a:chExt cx="0" cy="0"/>
+        </a:xfrm>
+      </p:grpSpPr>
+      <p:sp>
+        <p:nvSpPr>
+          <p:cNvPr id="104" name="Google Shape;104;g324fb4a8e0b_0_50:notes"/>
+          <p:cNvSpPr/>
+          <p:nvPr>
+            <p:ph idx="2" type="sldImg"/>
+          </p:nvPr>
+        </p:nvSpPr>
+        <p:spPr>
+          <a:xfrm>
+            <a:off x="381300" y="685800"/>
+            <a:ext cx="6096000" cy="3429000"/>
+          </a:xfrm>
+          <a:custGeom>
+            <a:rect b="b" l="l" r="r" t="t"/>
+            <a:pathLst>
+              <a:path extrusionOk="0" h="120000" w="120000">
+                <a:moveTo>
+                  <a:pt x="0" y="0"/>
+                </a:moveTo>
+                <a:lnTo>
+                  <a:pt x="120000" y="0"/>
+                </a:lnTo>
+                <a:lnTo>
+                  <a:pt x="120000" y="120000"/>
+                </a:lnTo>
+                <a:lnTo>
+                  <a:pt x="0" y="120000"/>
+                </a:lnTo>
+                <a:close/>
+              </a:path>
+            </a:pathLst>
+          </a:custGeom>
+        </p:spPr>
+      </p:sp>
+      <p:sp>
+        <p:nvSpPr>
+          <p:cNvPr id="105" name="Google Shape;105;g324fb4a8e0b_0_50:notes"/>
           <p:cNvSpPr txBox="1"/>
           <p:nvPr>
             <p:ph idx="1" type="body"/>
@@ -7264,7 +7364,7 @@
             <a:tbl>
               <a:tblPr>
                 <a:noFill/>
-                <a:tableStyleId>{2448B8CD-12FF-4C6E-B851-D3B8DF2E7992}</a:tableStyleId>
+                <a:tableStyleId>{055326DD-A242-44BC-944C-8D3D036F9016}</a:tableStyleId>
               </a:tblPr>
               <a:tblGrid>
                 <a:gridCol w="3619500"/>
@@ -7832,6 +7932,240 @@
           </a:ln>
         </p:spPr>
       </p:pic>
+    </p:spTree>
+  </p:cSld>
+  <p:clrMapOvr>
+    <a:masterClrMapping/>
+  </p:clrMapOvr>
+</p:sld>
+</file>
+
+<file path=ppt/slides/slide9.xml><?xml version="1.0" encoding="utf-8"?>
+<p:sld xmlns:a="http://schemas.openxmlformats.org/drawingml/2006/main" xmlns:r="http://schemas.openxmlformats.org/officeDocument/2006/relationships" xmlns:mc="http://schemas.openxmlformats.org/markup-compatibility/2006" xmlns:mv="urn:schemas-microsoft-com:mac:vml" xmlns:p="http://schemas.openxmlformats.org/presentationml/2006/main" xmlns:c="http://schemas.openxmlformats.org/drawingml/2006/chart" xmlns:dgm="http://schemas.openxmlformats.org/drawingml/2006/diagram" xmlns:o="urn:schemas-microsoft-com:office:office" xmlns:v="urn:schemas-microsoft-com:vml" xmlns:pvml="urn:schemas-microsoft-com:office:powerpoint" xmlns:com="http://schemas.openxmlformats.org/drawingml/2006/compatibility" xmlns:p14="http://schemas.microsoft.com/office/powerpoint/2010/main" xmlns:p15="http://schemas.microsoft.com/office/powerpoint/2012/main" xmlns:ahyp="http://schemas.microsoft.com/office/drawing/2018/hyperlinkcolor">
+  <p:cSld>
+    <p:spTree>
+      <p:nvGrpSpPr>
+        <p:cNvPr id="106" name="Shape 106"/>
+        <p:cNvGrpSpPr/>
+        <p:nvPr/>
+      </p:nvGrpSpPr>
+      <p:grpSpPr>
+        <a:xfrm>
+          <a:off x="0" y="0"/>
+          <a:ext cx="0" cy="0"/>
+          <a:chOff x="0" y="0"/>
+          <a:chExt cx="0" cy="0"/>
+        </a:xfrm>
+      </p:grpSpPr>
+      <p:sp>
+        <p:nvSpPr>
+          <p:cNvPr id="107" name="Google Shape;107;p21"/>
+          <p:cNvSpPr txBox="1"/>
+          <p:nvPr>
+            <p:ph type="title"/>
+          </p:nvPr>
+        </p:nvSpPr>
+        <p:spPr>
+          <a:xfrm>
+            <a:off x="311700" y="445025"/>
+            <a:ext cx="8520600" cy="572700"/>
+          </a:xfrm>
+          <a:prstGeom prst="rect">
+            <a:avLst/>
+          </a:prstGeom>
+        </p:spPr>
+        <p:txBody>
+          <a:bodyPr anchorCtr="0" anchor="t" bIns="91425" lIns="91425" spcFirstLastPara="1" rIns="91425" wrap="square" tIns="91425">
+            <a:normAutofit fontScale="90000"/>
+          </a:bodyPr>
+          <a:lstStyle/>
+          <a:p>
+            <a:pPr indent="0" lvl="0" marL="0" rtl="0" algn="l">
+              <a:spcBef>
+                <a:spcPts val="0"/>
+              </a:spcBef>
+              <a:spcAft>
+                <a:spcPts val="0"/>
+              </a:spcAft>
+              <a:buNone/>
+            </a:pPr>
+            <a:r>
+              <a:rPr lang="en">
+                <a:solidFill>
+                  <a:schemeClr val="lt1"/>
+                </a:solidFill>
+              </a:rPr>
+              <a:t>References</a:t>
+            </a:r>
+            <a:endParaRPr>
+              <a:solidFill>
+                <a:schemeClr val="lt1"/>
+              </a:solidFill>
+            </a:endParaRPr>
+          </a:p>
+        </p:txBody>
+      </p:sp>
+      <p:sp>
+        <p:nvSpPr>
+          <p:cNvPr id="108" name="Google Shape;108;p21"/>
+          <p:cNvSpPr txBox="1"/>
+          <p:nvPr>
+            <p:ph idx="1" type="body"/>
+          </p:nvPr>
+        </p:nvSpPr>
+        <p:spPr>
+          <a:xfrm>
+            <a:off x="311700" y="1152475"/>
+            <a:ext cx="8520600" cy="3416400"/>
+          </a:xfrm>
+          <a:prstGeom prst="rect">
+            <a:avLst/>
+          </a:prstGeom>
+        </p:spPr>
+        <p:txBody>
+          <a:bodyPr anchorCtr="0" anchor="t" bIns="91425" lIns="91425" spcFirstLastPara="1" rIns="91425" wrap="square" tIns="91425">
+            <a:normAutofit/>
+          </a:bodyPr>
+          <a:lstStyle/>
+          <a:p>
+            <a:pPr indent="-342900" lvl="0" marL="457200" rtl="0" algn="l">
+              <a:lnSpc>
+                <a:spcPct val="200000"/>
+              </a:lnSpc>
+              <a:spcBef>
+                <a:spcPts val="0"/>
+              </a:spcBef>
+              <a:spcAft>
+                <a:spcPts val="0"/>
+              </a:spcAft>
+              <a:buClr>
+                <a:schemeClr val="lt1"/>
+              </a:buClr>
+              <a:buSzPts val="1800"/>
+              <a:buChar char="●"/>
+            </a:pPr>
+            <a:r>
+              <a:rPr lang="en" sz="1200">
+                <a:solidFill>
+                  <a:schemeClr val="lt1"/>
+                </a:solidFill>
+              </a:rPr>
+              <a:t>Kim, G., Debois, P., Willis, J., &amp; Humble, J. (2016). </a:t>
+            </a:r>
+            <a:r>
+              <a:rPr i="1" lang="en" sz="1200">
+                <a:solidFill>
+                  <a:schemeClr val="lt1"/>
+                </a:solidFill>
+              </a:rPr>
+              <a:t>The DevOps Handbook: How to Create World-Class Agility, Reliability, and Security in Technology Organizations</a:t>
+            </a:r>
+            <a:r>
+              <a:rPr lang="en" sz="1200">
+                <a:solidFill>
+                  <a:schemeClr val="lt1"/>
+                </a:solidFill>
+              </a:rPr>
+              <a:t>. https://dl.acm.org/citation.cfm?id=3044729</a:t>
+            </a:r>
+            <a:endParaRPr sz="1200">
+              <a:solidFill>
+                <a:schemeClr val="lt1"/>
+              </a:solidFill>
+            </a:endParaRPr>
+          </a:p>
+          <a:p>
+            <a:pPr indent="-342900" lvl="0" marL="457200" rtl="0" algn="l">
+              <a:lnSpc>
+                <a:spcPct val="200000"/>
+              </a:lnSpc>
+              <a:spcBef>
+                <a:spcPts val="0"/>
+              </a:spcBef>
+              <a:spcAft>
+                <a:spcPts val="0"/>
+              </a:spcAft>
+              <a:buClr>
+                <a:schemeClr val="lt1"/>
+              </a:buClr>
+              <a:buSzPts val="1800"/>
+              <a:buChar char="●"/>
+            </a:pPr>
+            <a:r>
+              <a:rPr lang="en" sz="1200">
+                <a:solidFill>
+                  <a:schemeClr val="lt1"/>
+                </a:solidFill>
+              </a:rPr>
+              <a:t>Beal, H. (n.d.). </a:t>
+            </a:r>
+            <a:r>
+              <a:rPr i="1" lang="en" sz="1200">
+                <a:solidFill>
+                  <a:schemeClr val="lt1"/>
+                </a:solidFill>
+              </a:rPr>
+              <a:t>What is a Value Stream?</a:t>
+            </a:r>
+            <a:r>
+              <a:rPr lang="en" sz="1200">
+                <a:solidFill>
+                  <a:schemeClr val="lt1"/>
+                </a:solidFill>
+              </a:rPr>
+              <a:t> https://www.vsmconsortium.org/blog/what-is-a-value-stream#:~:text=%E2%80%9CIn%20DevOps%2C%20we%20typically%20define,.%E2%80%9D%20(Learning%20to%20See)</a:t>
+            </a:r>
+            <a:endParaRPr sz="1200">
+              <a:solidFill>
+                <a:schemeClr val="lt1"/>
+              </a:solidFill>
+            </a:endParaRPr>
+          </a:p>
+          <a:p>
+            <a:pPr indent="-342900" lvl="0" marL="457200" rtl="0" algn="l">
+              <a:lnSpc>
+                <a:spcPct val="200000"/>
+              </a:lnSpc>
+              <a:spcBef>
+                <a:spcPts val="0"/>
+              </a:spcBef>
+              <a:spcAft>
+                <a:spcPts val="0"/>
+              </a:spcAft>
+              <a:buClr>
+                <a:schemeClr val="lt1"/>
+              </a:buClr>
+              <a:buSzPts val="1800"/>
+              <a:buChar char="●"/>
+            </a:pPr>
+            <a:r>
+              <a:rPr lang="en" sz="1200">
+                <a:solidFill>
+                  <a:schemeClr val="lt1"/>
+                </a:solidFill>
+              </a:rPr>
+              <a:t>Ely, R. (2022, January 19). </a:t>
+            </a:r>
+            <a:r>
+              <a:rPr i="1" lang="en" sz="1200">
+                <a:solidFill>
+                  <a:schemeClr val="lt1"/>
+                </a:solidFill>
+              </a:rPr>
+              <a:t>Value Stream Management: Explained in Plain English</a:t>
+            </a:r>
+            <a:r>
+              <a:rPr lang="en" sz="1200">
+                <a:solidFill>
+                  <a:schemeClr val="lt1"/>
+                </a:solidFill>
+              </a:rPr>
+              <a:t>. DevOps Institute. https://www.devopsinstitute.com/value-stream-management-explained-in-plain-english/</a:t>
+            </a:r>
+            <a:endParaRPr/>
+          </a:p>
+        </p:txBody>
+      </p:sp>
     </p:spTree>
   </p:cSld>
   <p:clrMapOvr>

</xml_diff>